<commit_message>
moved identify_inpatient_admission function outside of JsonHash class
</commit_message>
<xml_diff>
--- a/Project Lambda.pptx
+++ b/Project Lambda.pptx
@@ -5,7 +5,7 @@
     <p:sldMasterId id="2147483658" r:id="rId1"/>
   </p:sldMasterIdLst>
   <p:notesMasterIdLst>
-    <p:notesMasterId r:id="rId23"/>
+    <p:notesMasterId r:id="rId21"/>
   </p:notesMasterIdLst>
   <p:sldIdLst>
     <p:sldId id="256" r:id="rId2"/>
@@ -21,38 +21,36 @@
     <p:sldId id="268" r:id="rId12"/>
     <p:sldId id="260" r:id="rId13"/>
     <p:sldId id="287" r:id="rId14"/>
-    <p:sldId id="269" r:id="rId15"/>
-    <p:sldId id="270" r:id="rId16"/>
-    <p:sldId id="271" r:id="rId17"/>
-    <p:sldId id="272" r:id="rId18"/>
-    <p:sldId id="276" r:id="rId19"/>
-    <p:sldId id="277" r:id="rId20"/>
-    <p:sldId id="278" r:id="rId21"/>
-    <p:sldId id="280" r:id="rId22"/>
+    <p:sldId id="271" r:id="rId15"/>
+    <p:sldId id="272" r:id="rId16"/>
+    <p:sldId id="276" r:id="rId17"/>
+    <p:sldId id="277" r:id="rId18"/>
+    <p:sldId id="278" r:id="rId19"/>
+    <p:sldId id="280" r:id="rId20"/>
   </p:sldIdLst>
   <p:sldSz cx="9144000" cy="5143500" type="screen16x9"/>
   <p:notesSz cx="6858000" cy="9144000"/>
   <p:embeddedFontLst>
     <p:embeddedFont>
       <p:font typeface="Lato" panose="020F0502020204030203" pitchFamily="34" charset="0"/>
-      <p:regular r:id="rId24"/>
-      <p:bold r:id="rId25"/>
-      <p:italic r:id="rId26"/>
-      <p:boldItalic r:id="rId27"/>
+      <p:regular r:id="rId22"/>
+      <p:bold r:id="rId23"/>
+      <p:italic r:id="rId24"/>
+      <p:boldItalic r:id="rId25"/>
     </p:embeddedFont>
     <p:embeddedFont>
       <p:font typeface="Raleway" pitchFamily="2" charset="77"/>
-      <p:regular r:id="rId28"/>
-      <p:bold r:id="rId29"/>
-      <p:italic r:id="rId30"/>
-      <p:boldItalic r:id="rId31"/>
+      <p:regular r:id="rId26"/>
+      <p:bold r:id="rId27"/>
+      <p:italic r:id="rId28"/>
+      <p:boldItalic r:id="rId29"/>
     </p:embeddedFont>
     <p:embeddedFont>
       <p:font typeface="Roboto" panose="02000000000000000000" pitchFamily="2" charset="0"/>
-      <p:regular r:id="rId32"/>
-      <p:bold r:id="rId33"/>
-      <p:italic r:id="rId34"/>
-      <p:boldItalic r:id="rId35"/>
+      <p:regular r:id="rId30"/>
+      <p:bold r:id="rId31"/>
+      <p:italic r:id="rId32"/>
+      <p:boldItalic r:id="rId33"/>
     </p:embeddedFont>
   </p:embeddedFontLst>
   <p:defaultTextStyle>
@@ -1278,218 +1276,6 @@
   <p:cSld>
     <p:spTree>
       <p:nvGrpSpPr>
-        <p:cNvPr id="1" name="Shape 154"/>
-        <p:cNvGrpSpPr/>
-        <p:nvPr/>
-      </p:nvGrpSpPr>
-      <p:grpSpPr>
-        <a:xfrm>
-          <a:off x="0" y="0"/>
-          <a:ext cx="0" cy="0"/>
-          <a:chOff x="0" y="0"/>
-          <a:chExt cx="0" cy="0"/>
-        </a:xfrm>
-      </p:grpSpPr>
-      <p:sp>
-        <p:nvSpPr>
-          <p:cNvPr id="155" name="Google Shape;155;g125cd947deb_0_53:notes"/>
-          <p:cNvSpPr>
-            <a:spLocks noGrp="1" noRot="1" noChangeAspect="1"/>
-          </p:cNvSpPr>
-          <p:nvPr>
-            <p:ph type="sldImg" idx="2"/>
-          </p:nvPr>
-        </p:nvSpPr>
-        <p:spPr>
-          <a:xfrm>
-            <a:off x="381300" y="685800"/>
-            <a:ext cx="6096000" cy="3429000"/>
-          </a:xfrm>
-          <a:custGeom>
-            <a:avLst/>
-            <a:gdLst/>
-            <a:ahLst/>
-            <a:cxnLst/>
-            <a:rect l="l" t="t" r="r" b="b"/>
-            <a:pathLst>
-              <a:path w="120000" h="120000" extrusionOk="0">
-                <a:moveTo>
-                  <a:pt x="0" y="0"/>
-                </a:moveTo>
-                <a:lnTo>
-                  <a:pt x="120000" y="0"/>
-                </a:lnTo>
-                <a:lnTo>
-                  <a:pt x="120000" y="120000"/>
-                </a:lnTo>
-                <a:lnTo>
-                  <a:pt x="0" y="120000"/>
-                </a:lnTo>
-                <a:close/>
-              </a:path>
-            </a:pathLst>
-          </a:custGeom>
-        </p:spPr>
-      </p:sp>
-      <p:sp>
-        <p:nvSpPr>
-          <p:cNvPr id="156" name="Google Shape;156;g125cd947deb_0_53:notes"/>
-          <p:cNvSpPr txBox="1">
-            <a:spLocks noGrp="1"/>
-          </p:cNvSpPr>
-          <p:nvPr>
-            <p:ph type="body" idx="1"/>
-          </p:nvPr>
-        </p:nvSpPr>
-        <p:spPr>
-          <a:xfrm>
-            <a:off x="685800" y="4343400"/>
-            <a:ext cx="5486400" cy="4114800"/>
-          </a:xfrm>
-          <a:prstGeom prst="rect">
-            <a:avLst/>
-          </a:prstGeom>
-        </p:spPr>
-        <p:txBody>
-          <a:bodyPr spcFirstLastPara="1" wrap="square" lIns="91425" tIns="91425" rIns="91425" bIns="91425" anchor="t" anchorCtr="0">
-            <a:noAutofit/>
-          </a:bodyPr>
-          <a:lstStyle/>
-          <a:p>
-            <a:pPr marL="0" lvl="0" indent="0" algn="l" rtl="0">
-              <a:spcBef>
-                <a:spcPts val="0"/>
-              </a:spcBef>
-              <a:spcAft>
-                <a:spcPts val="0"/>
-              </a:spcAft>
-              <a:buNone/>
-            </a:pPr>
-            <a:r>
-              <a:rPr lang="en"/>
-              <a:t>curl -X GET https://ctxkde5661.execute-api.us-east-1.amazonaws.com/beta -H 'x-api-key: mcBkWftQ2p9s0Mhqf8Yni9EfdL8h2JX14HHUFGvJ'</a:t>
-            </a:r>
-            <a:endParaRPr/>
-          </a:p>
-        </p:txBody>
-      </p:sp>
-    </p:spTree>
-  </p:cSld>
-  <p:clrMapOvr>
-    <a:masterClrMapping/>
-  </p:clrMapOvr>
-</p:notes>
-</file>
-
-<file path=ppt/notesSlides/notesSlide15.xml><?xml version="1.0" encoding="utf-8"?>
-<p:notes xmlns:a="http://schemas.openxmlformats.org/drawingml/2006/main" xmlns:r="http://schemas.openxmlformats.org/officeDocument/2006/relationships" xmlns:p="http://schemas.openxmlformats.org/presentationml/2006/main" showMasterSp="0" showMasterPhAnim="0">
-  <p:cSld>
-    <p:spTree>
-      <p:nvGrpSpPr>
-        <p:cNvPr id="1" name="Shape 159"/>
-        <p:cNvGrpSpPr/>
-        <p:nvPr/>
-      </p:nvGrpSpPr>
-      <p:grpSpPr>
-        <a:xfrm>
-          <a:off x="0" y="0"/>
-          <a:ext cx="0" cy="0"/>
-          <a:chOff x="0" y="0"/>
-          <a:chExt cx="0" cy="0"/>
-        </a:xfrm>
-      </p:grpSpPr>
-      <p:sp>
-        <p:nvSpPr>
-          <p:cNvPr id="160" name="Google Shape;160;g125cd947deb_0_57:notes"/>
-          <p:cNvSpPr>
-            <a:spLocks noGrp="1" noRot="1" noChangeAspect="1"/>
-          </p:cNvSpPr>
-          <p:nvPr>
-            <p:ph type="sldImg" idx="2"/>
-          </p:nvPr>
-        </p:nvSpPr>
-        <p:spPr>
-          <a:xfrm>
-            <a:off x="381000" y="685800"/>
-            <a:ext cx="6096000" cy="3429000"/>
-          </a:xfrm>
-          <a:custGeom>
-            <a:avLst/>
-            <a:gdLst/>
-            <a:ahLst/>
-            <a:cxnLst/>
-            <a:rect l="l" t="t" r="r" b="b"/>
-            <a:pathLst>
-              <a:path w="120000" h="120000" extrusionOk="0">
-                <a:moveTo>
-                  <a:pt x="0" y="0"/>
-                </a:moveTo>
-                <a:lnTo>
-                  <a:pt x="120000" y="0"/>
-                </a:lnTo>
-                <a:lnTo>
-                  <a:pt x="120000" y="120000"/>
-                </a:lnTo>
-                <a:lnTo>
-                  <a:pt x="0" y="120000"/>
-                </a:lnTo>
-                <a:close/>
-              </a:path>
-            </a:pathLst>
-          </a:custGeom>
-        </p:spPr>
-      </p:sp>
-      <p:sp>
-        <p:nvSpPr>
-          <p:cNvPr id="161" name="Google Shape;161;g125cd947deb_0_57:notes"/>
-          <p:cNvSpPr txBox="1">
-            <a:spLocks noGrp="1"/>
-          </p:cNvSpPr>
-          <p:nvPr>
-            <p:ph type="body" idx="1"/>
-          </p:nvPr>
-        </p:nvSpPr>
-        <p:spPr>
-          <a:xfrm>
-            <a:off x="685800" y="4343400"/>
-            <a:ext cx="5486400" cy="4114800"/>
-          </a:xfrm>
-          <a:prstGeom prst="rect">
-            <a:avLst/>
-          </a:prstGeom>
-        </p:spPr>
-        <p:txBody>
-          <a:bodyPr spcFirstLastPara="1" wrap="square" lIns="91425" tIns="91425" rIns="91425" bIns="91425" anchor="t" anchorCtr="0">
-            <a:noAutofit/>
-          </a:bodyPr>
-          <a:lstStyle/>
-          <a:p>
-            <a:pPr marL="0" lvl="0" indent="0" algn="l" rtl="0">
-              <a:spcBef>
-                <a:spcPts val="0"/>
-              </a:spcBef>
-              <a:spcAft>
-                <a:spcPts val="0"/>
-              </a:spcAft>
-              <a:buNone/>
-            </a:pPr>
-            <a:endParaRPr/>
-          </a:p>
-        </p:txBody>
-      </p:sp>
-    </p:spTree>
-  </p:cSld>
-  <p:clrMapOvr>
-    <a:masterClrMapping/>
-  </p:clrMapOvr>
-</p:notes>
-</file>
-
-<file path=ppt/notesSlides/notesSlide16.xml><?xml version="1.0" encoding="utf-8"?>
-<p:notes xmlns:a="http://schemas.openxmlformats.org/drawingml/2006/main" xmlns:r="http://schemas.openxmlformats.org/officeDocument/2006/relationships" xmlns:p="http://schemas.openxmlformats.org/presentationml/2006/main" showMasterSp="0" showMasterPhAnim="0">
-  <p:cSld>
-    <p:spTree>
-      <p:nvGrpSpPr>
         <p:cNvPr id="1" name="Shape 165"/>
         <p:cNvGrpSpPr/>
         <p:nvPr/>
@@ -1593,7 +1379,7 @@
 </p:notes>
 </file>
 
-<file path=ppt/notesSlides/notesSlide17.xml><?xml version="1.0" encoding="utf-8"?>
+<file path=ppt/notesSlides/notesSlide15.xml><?xml version="1.0" encoding="utf-8"?>
 <p:notes xmlns:a="http://schemas.openxmlformats.org/drawingml/2006/main" xmlns:r="http://schemas.openxmlformats.org/officeDocument/2006/relationships" xmlns:p="http://schemas.openxmlformats.org/presentationml/2006/main" showMasterSp="0" showMasterPhAnim="0">
   <p:cSld>
     <p:spTree>
@@ -1697,7 +1483,7 @@
 </p:notes>
 </file>
 
-<file path=ppt/notesSlides/notesSlide18.xml><?xml version="1.0" encoding="utf-8"?>
+<file path=ppt/notesSlides/notesSlide16.xml><?xml version="1.0" encoding="utf-8"?>
 <p:notes xmlns:a="http://schemas.openxmlformats.org/drawingml/2006/main" xmlns:r="http://schemas.openxmlformats.org/officeDocument/2006/relationships" xmlns:p="http://schemas.openxmlformats.org/presentationml/2006/main" showMasterSp="0" showMasterPhAnim="0">
   <p:cSld>
     <p:spTree>
@@ -1801,7 +1587,7 @@
 </p:notes>
 </file>
 
-<file path=ppt/notesSlides/notesSlide19.xml><?xml version="1.0" encoding="utf-8"?>
+<file path=ppt/notesSlides/notesSlide17.xml><?xml version="1.0" encoding="utf-8"?>
 <p:notes xmlns:a="http://schemas.openxmlformats.org/drawingml/2006/main" xmlns:r="http://schemas.openxmlformats.org/officeDocument/2006/relationships" xmlns:p="http://schemas.openxmlformats.org/presentationml/2006/main" showMasterSp="0" showMasterPhAnim="0">
   <p:cSld>
     <p:spTree>
@@ -1905,111 +1691,7 @@
 </p:notes>
 </file>
 
-<file path=ppt/notesSlides/notesSlide2.xml><?xml version="1.0" encoding="utf-8"?>
-<p:notes xmlns:a="http://schemas.openxmlformats.org/drawingml/2006/main" xmlns:r="http://schemas.openxmlformats.org/officeDocument/2006/relationships" xmlns:p="http://schemas.openxmlformats.org/presentationml/2006/main" showMasterSp="0" showMasterPhAnim="0">
-  <p:cSld>
-    <p:spTree>
-      <p:nvGrpSpPr>
-        <p:cNvPr id="1" name="Shape 84"/>
-        <p:cNvGrpSpPr/>
-        <p:nvPr/>
-      </p:nvGrpSpPr>
-      <p:grpSpPr>
-        <a:xfrm>
-          <a:off x="0" y="0"/>
-          <a:ext cx="0" cy="0"/>
-          <a:chOff x="0" y="0"/>
-          <a:chExt cx="0" cy="0"/>
-        </a:xfrm>
-      </p:grpSpPr>
-      <p:sp>
-        <p:nvSpPr>
-          <p:cNvPr id="85" name="Google Shape;85;g12230eb1a9b_0_148:notes"/>
-          <p:cNvSpPr>
-            <a:spLocks noGrp="1" noRot="1" noChangeAspect="1"/>
-          </p:cNvSpPr>
-          <p:nvPr>
-            <p:ph type="sldImg" idx="2"/>
-          </p:nvPr>
-        </p:nvSpPr>
-        <p:spPr>
-          <a:xfrm>
-            <a:off x="381000" y="685800"/>
-            <a:ext cx="6096000" cy="3429000"/>
-          </a:xfrm>
-          <a:custGeom>
-            <a:avLst/>
-            <a:gdLst/>
-            <a:ahLst/>
-            <a:cxnLst/>
-            <a:rect l="l" t="t" r="r" b="b"/>
-            <a:pathLst>
-              <a:path w="120000" h="120000" extrusionOk="0">
-                <a:moveTo>
-                  <a:pt x="0" y="0"/>
-                </a:moveTo>
-                <a:lnTo>
-                  <a:pt x="120000" y="0"/>
-                </a:lnTo>
-                <a:lnTo>
-                  <a:pt x="120000" y="120000"/>
-                </a:lnTo>
-                <a:lnTo>
-                  <a:pt x="0" y="120000"/>
-                </a:lnTo>
-                <a:close/>
-              </a:path>
-            </a:pathLst>
-          </a:custGeom>
-        </p:spPr>
-      </p:sp>
-      <p:sp>
-        <p:nvSpPr>
-          <p:cNvPr id="86" name="Google Shape;86;g12230eb1a9b_0_148:notes"/>
-          <p:cNvSpPr txBox="1">
-            <a:spLocks noGrp="1"/>
-          </p:cNvSpPr>
-          <p:nvPr>
-            <p:ph type="body" idx="1"/>
-          </p:nvPr>
-        </p:nvSpPr>
-        <p:spPr>
-          <a:xfrm>
-            <a:off x="685800" y="4343400"/>
-            <a:ext cx="5486400" cy="4114800"/>
-          </a:xfrm>
-          <a:prstGeom prst="rect">
-            <a:avLst/>
-          </a:prstGeom>
-        </p:spPr>
-        <p:txBody>
-          <a:bodyPr spcFirstLastPara="1" wrap="square" lIns="91425" tIns="91425" rIns="91425" bIns="91425" anchor="t" anchorCtr="0">
-            <a:noAutofit/>
-          </a:bodyPr>
-          <a:lstStyle/>
-          <a:p>
-            <a:pPr marL="0" lvl="0" indent="0" algn="l" rtl="0">
-              <a:spcBef>
-                <a:spcPts val="0"/>
-              </a:spcBef>
-              <a:spcAft>
-                <a:spcPts val="0"/>
-              </a:spcAft>
-              <a:buNone/>
-            </a:pPr>
-            <a:endParaRPr/>
-          </a:p>
-        </p:txBody>
-      </p:sp>
-    </p:spTree>
-  </p:cSld>
-  <p:clrMapOvr>
-    <a:masterClrMapping/>
-  </p:clrMapOvr>
-</p:notes>
-</file>
-
-<file path=ppt/notesSlides/notesSlide20.xml><?xml version="1.0" encoding="utf-8"?>
+<file path=ppt/notesSlides/notesSlide18.xml><?xml version="1.0" encoding="utf-8"?>
 <p:notes xmlns:a="http://schemas.openxmlformats.org/drawingml/2006/main" xmlns:r="http://schemas.openxmlformats.org/officeDocument/2006/relationships" xmlns:p="http://schemas.openxmlformats.org/presentationml/2006/main" showMasterSp="0" showMasterPhAnim="0">
   <p:cSld>
     <p:spTree>
@@ -2113,7 +1795,7 @@
 </p:notes>
 </file>
 
-<file path=ppt/notesSlides/notesSlide21.xml><?xml version="1.0" encoding="utf-8"?>
+<file path=ppt/notesSlides/notesSlide19.xml><?xml version="1.0" encoding="utf-8"?>
 <p:notes xmlns:a="http://schemas.openxmlformats.org/drawingml/2006/main" xmlns:r="http://schemas.openxmlformats.org/officeDocument/2006/relationships" xmlns:p="http://schemas.openxmlformats.org/presentationml/2006/main" showMasterSp="0" showMasterPhAnim="0">
   <p:cSld>
     <p:spTree>
@@ -2174,6 +1856,110 @@
       <p:sp>
         <p:nvSpPr>
           <p:cNvPr id="236" name="Google Shape;236;g12b4061b8ed_0_0:notes"/>
+          <p:cNvSpPr txBox="1">
+            <a:spLocks noGrp="1"/>
+          </p:cNvSpPr>
+          <p:nvPr>
+            <p:ph type="body" idx="1"/>
+          </p:nvPr>
+        </p:nvSpPr>
+        <p:spPr>
+          <a:xfrm>
+            <a:off x="685800" y="4343400"/>
+            <a:ext cx="5486400" cy="4114800"/>
+          </a:xfrm>
+          <a:prstGeom prst="rect">
+            <a:avLst/>
+          </a:prstGeom>
+        </p:spPr>
+        <p:txBody>
+          <a:bodyPr spcFirstLastPara="1" wrap="square" lIns="91425" tIns="91425" rIns="91425" bIns="91425" anchor="t" anchorCtr="0">
+            <a:noAutofit/>
+          </a:bodyPr>
+          <a:lstStyle/>
+          <a:p>
+            <a:pPr marL="0" lvl="0" indent="0" algn="l" rtl="0">
+              <a:spcBef>
+                <a:spcPts val="0"/>
+              </a:spcBef>
+              <a:spcAft>
+                <a:spcPts val="0"/>
+              </a:spcAft>
+              <a:buNone/>
+            </a:pPr>
+            <a:endParaRPr/>
+          </a:p>
+        </p:txBody>
+      </p:sp>
+    </p:spTree>
+  </p:cSld>
+  <p:clrMapOvr>
+    <a:masterClrMapping/>
+  </p:clrMapOvr>
+</p:notes>
+</file>
+
+<file path=ppt/notesSlides/notesSlide2.xml><?xml version="1.0" encoding="utf-8"?>
+<p:notes xmlns:a="http://schemas.openxmlformats.org/drawingml/2006/main" xmlns:r="http://schemas.openxmlformats.org/officeDocument/2006/relationships" xmlns:p="http://schemas.openxmlformats.org/presentationml/2006/main" showMasterSp="0" showMasterPhAnim="0">
+  <p:cSld>
+    <p:spTree>
+      <p:nvGrpSpPr>
+        <p:cNvPr id="1" name="Shape 84"/>
+        <p:cNvGrpSpPr/>
+        <p:nvPr/>
+      </p:nvGrpSpPr>
+      <p:grpSpPr>
+        <a:xfrm>
+          <a:off x="0" y="0"/>
+          <a:ext cx="0" cy="0"/>
+          <a:chOff x="0" y="0"/>
+          <a:chExt cx="0" cy="0"/>
+        </a:xfrm>
+      </p:grpSpPr>
+      <p:sp>
+        <p:nvSpPr>
+          <p:cNvPr id="85" name="Google Shape;85;g12230eb1a9b_0_148:notes"/>
+          <p:cNvSpPr>
+            <a:spLocks noGrp="1" noRot="1" noChangeAspect="1"/>
+          </p:cNvSpPr>
+          <p:nvPr>
+            <p:ph type="sldImg" idx="2"/>
+          </p:nvPr>
+        </p:nvSpPr>
+        <p:spPr>
+          <a:xfrm>
+            <a:off x="381000" y="685800"/>
+            <a:ext cx="6096000" cy="3429000"/>
+          </a:xfrm>
+          <a:custGeom>
+            <a:avLst/>
+            <a:gdLst/>
+            <a:ahLst/>
+            <a:cxnLst/>
+            <a:rect l="l" t="t" r="r" b="b"/>
+            <a:pathLst>
+              <a:path w="120000" h="120000" extrusionOk="0">
+                <a:moveTo>
+                  <a:pt x="0" y="0"/>
+                </a:moveTo>
+                <a:lnTo>
+                  <a:pt x="120000" y="0"/>
+                </a:lnTo>
+                <a:lnTo>
+                  <a:pt x="120000" y="120000"/>
+                </a:lnTo>
+                <a:lnTo>
+                  <a:pt x="0" y="120000"/>
+                </a:lnTo>
+                <a:close/>
+              </a:path>
+            </a:pathLst>
+          </a:custGeom>
+        </p:spPr>
+      </p:sp>
+      <p:sp>
+        <p:nvSpPr>
+          <p:cNvPr id="86" name="Google Shape;86;g12230eb1a9b_0_148:notes"/>
           <p:cNvSpPr txBox="1">
             <a:spLocks noGrp="1"/>
           </p:cNvSpPr>
@@ -9764,446 +9550,6 @@
   <p:cSld>
     <p:spTree>
       <p:nvGrpSpPr>
-        <p:cNvPr id="1" name="Shape 157"/>
-        <p:cNvGrpSpPr/>
-        <p:nvPr/>
-      </p:nvGrpSpPr>
-      <p:grpSpPr>
-        <a:xfrm>
-          <a:off x="0" y="0"/>
-          <a:ext cx="0" cy="0"/>
-          <a:chOff x="0" y="0"/>
-          <a:chExt cx="0" cy="0"/>
-        </a:xfrm>
-      </p:grpSpPr>
-      <p:sp>
-        <p:nvSpPr>
-          <p:cNvPr id="158" name="Google Shape;158;p25"/>
-          <p:cNvSpPr txBox="1">
-            <a:spLocks noGrp="1"/>
-          </p:cNvSpPr>
-          <p:nvPr>
-            <p:ph type="title"/>
-          </p:nvPr>
-        </p:nvSpPr>
-        <p:spPr>
-          <a:xfrm>
-            <a:off x="727800" y="3197800"/>
-            <a:ext cx="7688400" cy="749700"/>
-          </a:xfrm>
-          <a:prstGeom prst="rect">
-            <a:avLst/>
-          </a:prstGeom>
-        </p:spPr>
-        <p:txBody>
-          <a:bodyPr spcFirstLastPara="1" wrap="square" lIns="91425" tIns="91425" rIns="91425" bIns="91425" anchor="t" anchorCtr="0">
-            <a:normAutofit/>
-          </a:bodyPr>
-          <a:lstStyle/>
-          <a:p>
-            <a:pPr marL="0" lvl="0" indent="0" algn="l" rtl="0">
-              <a:spcBef>
-                <a:spcPts val="0"/>
-              </a:spcBef>
-              <a:spcAft>
-                <a:spcPts val="0"/>
-              </a:spcAft>
-              <a:buNone/>
-            </a:pPr>
-            <a:r>
-              <a:rPr lang="en" sz="3600"/>
-              <a:t>Next steps</a:t>
-            </a:r>
-            <a:endParaRPr sz="3600"/>
-          </a:p>
-        </p:txBody>
-      </p:sp>
-    </p:spTree>
-  </p:cSld>
-  <p:clrMapOvr>
-    <a:masterClrMapping/>
-  </p:clrMapOvr>
-</p:sld>
-</file>
-
-<file path=ppt/slides/slide15.xml><?xml version="1.0" encoding="utf-8"?>
-<p:sld xmlns:a="http://schemas.openxmlformats.org/drawingml/2006/main" xmlns:r="http://schemas.openxmlformats.org/officeDocument/2006/relationships" xmlns:p="http://schemas.openxmlformats.org/presentationml/2006/main">
-  <p:cSld>
-    <p:spTree>
-      <p:nvGrpSpPr>
-        <p:cNvPr id="1" name="Shape 162"/>
-        <p:cNvGrpSpPr/>
-        <p:nvPr/>
-      </p:nvGrpSpPr>
-      <p:grpSpPr>
-        <a:xfrm>
-          <a:off x="0" y="0"/>
-          <a:ext cx="0" cy="0"/>
-          <a:chOff x="0" y="0"/>
-          <a:chExt cx="0" cy="0"/>
-        </a:xfrm>
-      </p:grpSpPr>
-      <p:sp>
-        <p:nvSpPr>
-          <p:cNvPr id="163" name="Google Shape;163;p26"/>
-          <p:cNvSpPr txBox="1">
-            <a:spLocks noGrp="1"/>
-          </p:cNvSpPr>
-          <p:nvPr>
-            <p:ph type="title"/>
-          </p:nvPr>
-        </p:nvSpPr>
-        <p:spPr>
-          <a:xfrm>
-            <a:off x="727650" y="576800"/>
-            <a:ext cx="7688700" cy="535200"/>
-          </a:xfrm>
-          <a:prstGeom prst="rect">
-            <a:avLst/>
-          </a:prstGeom>
-        </p:spPr>
-        <p:txBody>
-          <a:bodyPr spcFirstLastPara="1" wrap="square" lIns="91425" tIns="91425" rIns="91425" bIns="91425" anchor="t" anchorCtr="0">
-            <a:normAutofit fontScale="90000"/>
-          </a:bodyPr>
-          <a:lstStyle/>
-          <a:p>
-            <a:pPr marL="0" lvl="0" indent="0" algn="l" rtl="0">
-              <a:spcBef>
-                <a:spcPts val="0"/>
-              </a:spcBef>
-              <a:spcAft>
-                <a:spcPts val="0"/>
-              </a:spcAft>
-              <a:buNone/>
-            </a:pPr>
-            <a:r>
-              <a:rPr lang="en"/>
-              <a:t>Tentative timeline</a:t>
-            </a:r>
-            <a:endParaRPr/>
-          </a:p>
-        </p:txBody>
-      </p:sp>
-      <p:sp>
-        <p:nvSpPr>
-          <p:cNvPr id="164" name="Google Shape;164;p26"/>
-          <p:cNvSpPr txBox="1">
-            <a:spLocks noGrp="1"/>
-          </p:cNvSpPr>
-          <p:nvPr>
-            <p:ph type="body" idx="1"/>
-          </p:nvPr>
-        </p:nvSpPr>
-        <p:spPr>
-          <a:xfrm>
-            <a:off x="729450" y="1372900"/>
-            <a:ext cx="7688700" cy="3553200"/>
-          </a:xfrm>
-          <a:prstGeom prst="rect">
-            <a:avLst/>
-          </a:prstGeom>
-        </p:spPr>
-        <p:txBody>
-          <a:bodyPr spcFirstLastPara="1" wrap="square" lIns="91425" tIns="91425" rIns="91425" bIns="91425" anchor="t" anchorCtr="0">
-            <a:normAutofit fontScale="92500"/>
-          </a:bodyPr>
-          <a:lstStyle/>
-          <a:p>
-            <a:pPr marL="457200" lvl="0" indent="-311150" algn="l" rtl="0">
-              <a:lnSpc>
-                <a:spcPct val="150000"/>
-              </a:lnSpc>
-              <a:spcBef>
-                <a:spcPts val="0"/>
-              </a:spcBef>
-              <a:spcAft>
-                <a:spcPts val="0"/>
-              </a:spcAft>
-              <a:buSzPts val="1300"/>
-              <a:buChar char="●"/>
-            </a:pPr>
-            <a:r>
-              <a:rPr lang="en" b="1" strike="sngStrike"/>
-              <a:t>Week 1 </a:t>
-            </a:r>
-            <a:endParaRPr b="1" strike="sngStrike"/>
-          </a:p>
-          <a:p>
-            <a:pPr marL="914400" lvl="1" indent="-298450" algn="l" rtl="0">
-              <a:lnSpc>
-                <a:spcPct val="150000"/>
-              </a:lnSpc>
-              <a:spcBef>
-                <a:spcPts val="0"/>
-              </a:spcBef>
-              <a:spcAft>
-                <a:spcPts val="0"/>
-              </a:spcAft>
-              <a:buSzPts val="1100"/>
-              <a:buChar char="○"/>
-            </a:pPr>
-            <a:r>
-              <a:rPr lang="en" b="1" strike="sngStrike"/>
-              <a:t>4/26 - Project kick-off / Choose and Research your metric</a:t>
-            </a:r>
-            <a:endParaRPr b="1" strike="sngStrike"/>
-          </a:p>
-          <a:p>
-            <a:pPr marL="1371600" lvl="2" indent="-298450" algn="l" rtl="0">
-              <a:lnSpc>
-                <a:spcPct val="150000"/>
-              </a:lnSpc>
-              <a:spcBef>
-                <a:spcPts val="0"/>
-              </a:spcBef>
-              <a:spcAft>
-                <a:spcPts val="0"/>
-              </a:spcAft>
-              <a:buSzPts val="1100"/>
-              <a:buChar char="■"/>
-            </a:pPr>
-            <a:r>
-              <a:rPr lang="en" b="1" strike="sngStrike"/>
-              <a:t>Bring a list of requirements (Exs: Diagnosis codes, CPT codes) to Thursday’s sync (4/28)</a:t>
-            </a:r>
-            <a:endParaRPr b="1" strike="sngStrike"/>
-          </a:p>
-          <a:p>
-            <a:pPr marL="1371600" lvl="2" indent="-298450" algn="l" rtl="0">
-              <a:lnSpc>
-                <a:spcPct val="150000"/>
-              </a:lnSpc>
-              <a:spcBef>
-                <a:spcPts val="0"/>
-              </a:spcBef>
-              <a:spcAft>
-                <a:spcPts val="0"/>
-              </a:spcAft>
-              <a:buSzPts val="1100"/>
-              <a:buChar char="■"/>
-            </a:pPr>
-            <a:r>
-              <a:rPr lang="en" b="1" strike="sngStrike"/>
-              <a:t>Grab time with Gary / Rich if you want to discuss</a:t>
-            </a:r>
-            <a:endParaRPr b="1" strike="sngStrike"/>
-          </a:p>
-          <a:p>
-            <a:pPr marL="914400" lvl="1" indent="-298450" algn="l" rtl="0">
-              <a:lnSpc>
-                <a:spcPct val="150000"/>
-              </a:lnSpc>
-              <a:spcBef>
-                <a:spcPts val="0"/>
-              </a:spcBef>
-              <a:spcAft>
-                <a:spcPts val="0"/>
-              </a:spcAft>
-              <a:buSzPts val="1100"/>
-              <a:buChar char="○"/>
-            </a:pPr>
-            <a:r>
-              <a:rPr lang="en" b="1" strike="sngStrike"/>
-              <a:t>4/28 - Create claims JSON structure (working session)</a:t>
-            </a:r>
-            <a:endParaRPr b="1" strike="sngStrike"/>
-          </a:p>
-          <a:p>
-            <a:pPr marL="457200" lvl="0" indent="-311150" algn="l" rtl="0">
-              <a:lnSpc>
-                <a:spcPct val="150000"/>
-              </a:lnSpc>
-              <a:spcBef>
-                <a:spcPts val="0"/>
-              </a:spcBef>
-              <a:spcAft>
-                <a:spcPts val="0"/>
-              </a:spcAft>
-              <a:buSzPts val="1300"/>
-              <a:buChar char="●"/>
-            </a:pPr>
-            <a:r>
-              <a:rPr lang="en" b="1"/>
-              <a:t>Week 2</a:t>
-            </a:r>
-            <a:endParaRPr b="1"/>
-          </a:p>
-          <a:p>
-            <a:pPr marL="914400" lvl="1" indent="-298450" algn="l" rtl="0">
-              <a:lnSpc>
-                <a:spcPct val="150000"/>
-              </a:lnSpc>
-              <a:spcBef>
-                <a:spcPts val="0"/>
-              </a:spcBef>
-              <a:spcAft>
-                <a:spcPts val="0"/>
-              </a:spcAft>
-              <a:buSzPts val="1100"/>
-              <a:buChar char="○"/>
-            </a:pPr>
-            <a:r>
-              <a:rPr lang="en" b="1"/>
-              <a:t>6/7 - Recap and next steps / Chien to build find_and() class method</a:t>
-            </a:r>
-            <a:endParaRPr b="1"/>
-          </a:p>
-          <a:p>
-            <a:pPr marL="914400" lvl="1" indent="-298450" algn="l" rtl="0">
-              <a:lnSpc>
-                <a:spcPct val="150000"/>
-              </a:lnSpc>
-              <a:spcBef>
-                <a:spcPts val="0"/>
-              </a:spcBef>
-              <a:spcAft>
-                <a:spcPts val="0"/>
-              </a:spcAft>
-              <a:buSzPts val="1100"/>
-              <a:buChar char="○"/>
-            </a:pPr>
-            <a:r>
-              <a:rPr lang="en" b="1"/>
-              <a:t>6/9 - Work on individual metrics</a:t>
-            </a:r>
-            <a:endParaRPr b="1"/>
-          </a:p>
-          <a:p>
-            <a:pPr marL="457200" lvl="0" indent="-311150" algn="l" rtl="0">
-              <a:lnSpc>
-                <a:spcPct val="150000"/>
-              </a:lnSpc>
-              <a:spcBef>
-                <a:spcPts val="0"/>
-              </a:spcBef>
-              <a:spcAft>
-                <a:spcPts val="0"/>
-              </a:spcAft>
-              <a:buSzPts val="1300"/>
-              <a:buChar char="●"/>
-            </a:pPr>
-            <a:r>
-              <a:rPr lang="en" b="1"/>
-              <a:t>Week 3</a:t>
-            </a:r>
-            <a:endParaRPr b="1"/>
-          </a:p>
-          <a:p>
-            <a:pPr marL="914400" lvl="1" indent="-298450" algn="l" rtl="0">
-              <a:lnSpc>
-                <a:spcPct val="150000"/>
-              </a:lnSpc>
-              <a:spcBef>
-                <a:spcPts val="0"/>
-              </a:spcBef>
-              <a:spcAft>
-                <a:spcPts val="0"/>
-              </a:spcAft>
-              <a:buSzPts val="1100"/>
-              <a:buChar char="○"/>
-            </a:pPr>
-            <a:r>
-              <a:rPr lang="en" b="1"/>
-              <a:t>6/14 - Review our individual metrics</a:t>
-            </a:r>
-            <a:endParaRPr b="1"/>
-          </a:p>
-          <a:p>
-            <a:pPr marL="914400" lvl="1" indent="-298450" algn="l" rtl="0">
-              <a:lnSpc>
-                <a:spcPct val="150000"/>
-              </a:lnSpc>
-              <a:spcBef>
-                <a:spcPts val="0"/>
-              </a:spcBef>
-              <a:spcAft>
-                <a:spcPts val="0"/>
-              </a:spcAft>
-              <a:buSzPts val="1100"/>
-              <a:buChar char="○"/>
-            </a:pPr>
-            <a:r>
-              <a:rPr lang="en" b="1"/>
-              <a:t>6/16 - Architecture build</a:t>
-            </a:r>
-            <a:endParaRPr b="1"/>
-          </a:p>
-          <a:p>
-            <a:pPr marL="457200" lvl="0" indent="-311150" algn="l" rtl="0">
-              <a:lnSpc>
-                <a:spcPct val="150000"/>
-              </a:lnSpc>
-              <a:spcBef>
-                <a:spcPts val="0"/>
-              </a:spcBef>
-              <a:spcAft>
-                <a:spcPts val="0"/>
-              </a:spcAft>
-              <a:buSzPts val="1300"/>
-              <a:buChar char="●"/>
-            </a:pPr>
-            <a:r>
-              <a:rPr lang="en" b="1"/>
-              <a:t>Week 4 </a:t>
-            </a:r>
-            <a:endParaRPr b="1"/>
-          </a:p>
-          <a:p>
-            <a:pPr marL="914400" lvl="1" indent="-298450" algn="l" rtl="0">
-              <a:lnSpc>
-                <a:spcPct val="150000"/>
-              </a:lnSpc>
-              <a:spcBef>
-                <a:spcPts val="0"/>
-              </a:spcBef>
-              <a:spcAft>
-                <a:spcPts val="0"/>
-              </a:spcAft>
-              <a:buSzPts val="1100"/>
-              <a:buChar char="○"/>
-            </a:pPr>
-            <a:r>
-              <a:rPr lang="en" b="1"/>
-              <a:t>6/21 - Project Retrospective</a:t>
-            </a:r>
-            <a:endParaRPr b="1"/>
-          </a:p>
-          <a:p>
-            <a:pPr marL="914400" lvl="1" indent="-298450" algn="l" rtl="0">
-              <a:lnSpc>
-                <a:spcPct val="150000"/>
-              </a:lnSpc>
-              <a:spcBef>
-                <a:spcPts val="0"/>
-              </a:spcBef>
-              <a:spcAft>
-                <a:spcPts val="0"/>
-              </a:spcAft>
-              <a:buSzPts val="1100"/>
-              <a:buChar char="○"/>
-            </a:pPr>
-            <a:r>
-              <a:rPr lang="en" b="1"/>
-              <a:t>6/23 - Demo! (optional)</a:t>
-            </a:r>
-            <a:endParaRPr b="1"/>
-          </a:p>
-        </p:txBody>
-      </p:sp>
-    </p:spTree>
-  </p:cSld>
-  <p:clrMapOvr>
-    <a:masterClrMapping/>
-  </p:clrMapOvr>
-</p:sld>
-</file>
-
-<file path=ppt/slides/slide16.xml><?xml version="1.0" encoding="utf-8"?>
-<p:sld xmlns:a="http://schemas.openxmlformats.org/drawingml/2006/main" xmlns:r="http://schemas.openxmlformats.org/officeDocument/2006/relationships" xmlns:p="http://schemas.openxmlformats.org/presentationml/2006/main">
-  <p:cSld>
-    <p:spTree>
-      <p:nvGrpSpPr>
         <p:cNvPr id="1" name="Shape 168"/>
         <p:cNvGrpSpPr/>
         <p:nvPr/>
@@ -10266,7 +9612,7 @@
 </p:sld>
 </file>
 
-<file path=ppt/slides/slide17.xml><?xml version="1.0" encoding="utf-8"?>
+<file path=ppt/slides/slide15.xml><?xml version="1.0" encoding="utf-8"?>
 <p:sld xmlns:a="http://schemas.openxmlformats.org/drawingml/2006/main" xmlns:r="http://schemas.openxmlformats.org/officeDocument/2006/relationships" xmlns:p="http://schemas.openxmlformats.org/presentationml/2006/main">
   <p:cSld>
     <p:spTree>
@@ -11548,7 +10894,7 @@
 </p:sld>
 </file>
 
-<file path=ppt/slides/slide18.xml><?xml version="1.0" encoding="utf-8"?>
+<file path=ppt/slides/slide16.xml><?xml version="1.0" encoding="utf-8"?>
 <p:sld xmlns:a="http://schemas.openxmlformats.org/drawingml/2006/main" xmlns:r="http://schemas.openxmlformats.org/officeDocument/2006/relationships" xmlns:p="http://schemas.openxmlformats.org/presentationml/2006/main">
   <p:cSld>
     <p:spTree>
@@ -13142,7 +12488,7 @@
 </p:sld>
 </file>
 
-<file path=ppt/slides/slide19.xml><?xml version="1.0" encoding="utf-8"?>
+<file path=ppt/slides/slide17.xml><?xml version="1.0" encoding="utf-8"?>
 <p:sld xmlns:a="http://schemas.openxmlformats.org/drawingml/2006/main" xmlns:r="http://schemas.openxmlformats.org/officeDocument/2006/relationships" xmlns:p="http://schemas.openxmlformats.org/presentationml/2006/main">
   <p:cSld>
     <p:spTree>
@@ -14711,505 +14057,7 @@
 </p:sld>
 </file>
 
-<file path=ppt/slides/slide2.xml><?xml version="1.0" encoding="utf-8"?>
-<p:sld xmlns:a="http://schemas.openxmlformats.org/drawingml/2006/main" xmlns:r="http://schemas.openxmlformats.org/officeDocument/2006/relationships" xmlns:p="http://schemas.openxmlformats.org/presentationml/2006/main">
-  <p:cSld>
-    <p:spTree>
-      <p:nvGrpSpPr>
-        <p:cNvPr id="1" name="Shape 87"/>
-        <p:cNvGrpSpPr/>
-        <p:nvPr/>
-      </p:nvGrpSpPr>
-      <p:grpSpPr>
-        <a:xfrm>
-          <a:off x="0" y="0"/>
-          <a:ext cx="0" cy="0"/>
-          <a:chOff x="0" y="0"/>
-          <a:chExt cx="0" cy="0"/>
-        </a:xfrm>
-      </p:grpSpPr>
-      <p:sp>
-        <p:nvSpPr>
-          <p:cNvPr id="88" name="Google Shape;88;p13"/>
-          <p:cNvSpPr txBox="1">
-            <a:spLocks noGrp="1"/>
-          </p:cNvSpPr>
-          <p:nvPr>
-            <p:ph type="body" idx="1"/>
-          </p:nvPr>
-        </p:nvSpPr>
-        <p:spPr>
-          <a:xfrm>
-            <a:off x="729450" y="1704100"/>
-            <a:ext cx="7688700" cy="2635800"/>
-          </a:xfrm>
-          <a:prstGeom prst="rect">
-            <a:avLst/>
-          </a:prstGeom>
-        </p:spPr>
-        <p:txBody>
-          <a:bodyPr spcFirstLastPara="1" wrap="square" lIns="91425" tIns="91425" rIns="91425" bIns="91425" anchor="t" anchorCtr="0">
-            <a:normAutofit/>
-          </a:bodyPr>
-          <a:lstStyle/>
-          <a:p>
-            <a:pPr marL="0" lvl="0" indent="0" algn="l" rtl="0">
-              <a:lnSpc>
-                <a:spcPct val="100000"/>
-              </a:lnSpc>
-              <a:spcBef>
-                <a:spcPts val="0"/>
-              </a:spcBef>
-              <a:spcAft>
-                <a:spcPts val="0"/>
-              </a:spcAft>
-              <a:buNone/>
-            </a:pPr>
-            <a:r>
-              <a:rPr lang="en" sz="1500" dirty="0"/>
-              <a:t>An opportunity to learn</a:t>
-            </a:r>
-            <a:endParaRPr sz="1500" dirty="0"/>
-          </a:p>
-          <a:p>
-            <a:pPr marL="0" lvl="0" indent="457200" algn="l" rtl="0">
-              <a:lnSpc>
-                <a:spcPct val="100000"/>
-              </a:lnSpc>
-              <a:spcBef>
-                <a:spcPts val="0"/>
-              </a:spcBef>
-              <a:spcAft>
-                <a:spcPts val="0"/>
-              </a:spcAft>
-              <a:buNone/>
-            </a:pPr>
-            <a:r>
-              <a:rPr lang="en" sz="1200" i="1" dirty="0">
-                <a:solidFill>
-                  <a:srgbClr val="999999"/>
-                </a:solidFill>
-              </a:rPr>
-              <a:t>A group project where everyone is learning something new.</a:t>
-            </a:r>
-            <a:endParaRPr sz="1200" i="1" dirty="0">
-              <a:solidFill>
-                <a:srgbClr val="999999"/>
-              </a:solidFill>
-            </a:endParaRPr>
-          </a:p>
-          <a:p>
-            <a:pPr marL="0" lvl="0" indent="0" algn="l" rtl="0">
-              <a:lnSpc>
-                <a:spcPct val="100000"/>
-              </a:lnSpc>
-              <a:spcBef>
-                <a:spcPts val="0"/>
-              </a:spcBef>
-              <a:spcAft>
-                <a:spcPts val="0"/>
-              </a:spcAft>
-              <a:buNone/>
-            </a:pPr>
-            <a:endParaRPr dirty="0"/>
-          </a:p>
-          <a:p>
-            <a:pPr marL="0" lvl="0" indent="0" algn="l" rtl="0">
-              <a:lnSpc>
-                <a:spcPct val="100000"/>
-              </a:lnSpc>
-              <a:spcBef>
-                <a:spcPts val="0"/>
-              </a:spcBef>
-              <a:spcAft>
-                <a:spcPts val="0"/>
-              </a:spcAft>
-              <a:buNone/>
-            </a:pPr>
-            <a:r>
-              <a:rPr lang="en" sz="1500" dirty="0"/>
-              <a:t>An opportunity to teach</a:t>
-            </a:r>
-            <a:endParaRPr sz="1500" dirty="0"/>
-          </a:p>
-          <a:p>
-            <a:pPr marL="0" lvl="0" indent="0" algn="l" rtl="0">
-              <a:lnSpc>
-                <a:spcPct val="100000"/>
-              </a:lnSpc>
-              <a:spcBef>
-                <a:spcPts val="0"/>
-              </a:spcBef>
-              <a:spcAft>
-                <a:spcPts val="0"/>
-              </a:spcAft>
-              <a:buNone/>
-            </a:pPr>
-            <a:r>
-              <a:rPr lang="en" sz="1100" i="1" dirty="0">
-                <a:solidFill>
-                  <a:srgbClr val="999999"/>
-                </a:solidFill>
-              </a:rPr>
-              <a:t>              </a:t>
-            </a:r>
-            <a:r>
-              <a:rPr lang="en" sz="1200" i="1" dirty="0">
-                <a:solidFill>
-                  <a:srgbClr val="999999"/>
-                </a:solidFill>
-              </a:rPr>
-              <a:t>We’ll divide up the work and teach each other what we’ve learned.</a:t>
-            </a:r>
-            <a:endParaRPr sz="1200" i="1" dirty="0">
-              <a:solidFill>
-                <a:srgbClr val="999999"/>
-              </a:solidFill>
-            </a:endParaRPr>
-          </a:p>
-          <a:p>
-            <a:pPr marL="0" lvl="0" indent="0" algn="l" rtl="0">
-              <a:lnSpc>
-                <a:spcPct val="100000"/>
-              </a:lnSpc>
-              <a:spcBef>
-                <a:spcPts val="0"/>
-              </a:spcBef>
-              <a:spcAft>
-                <a:spcPts val="0"/>
-              </a:spcAft>
-              <a:buNone/>
-            </a:pPr>
-            <a:endParaRPr dirty="0"/>
-          </a:p>
-          <a:p>
-            <a:pPr marL="0" lvl="0" indent="0" algn="l" rtl="0">
-              <a:lnSpc>
-                <a:spcPct val="100000"/>
-              </a:lnSpc>
-              <a:spcBef>
-                <a:spcPts val="0"/>
-              </a:spcBef>
-              <a:spcAft>
-                <a:spcPts val="0"/>
-              </a:spcAft>
-              <a:buNone/>
-            </a:pPr>
-            <a:r>
-              <a:rPr lang="en" sz="1500" dirty="0"/>
-              <a:t>An opportunity to collaborate</a:t>
-            </a:r>
-            <a:endParaRPr sz="1500" dirty="0"/>
-          </a:p>
-          <a:p>
-            <a:pPr marL="0" lvl="0" indent="457200" algn="l" rtl="0">
-              <a:lnSpc>
-                <a:spcPct val="100000"/>
-              </a:lnSpc>
-              <a:spcBef>
-                <a:spcPts val="0"/>
-              </a:spcBef>
-              <a:spcAft>
-                <a:spcPts val="0"/>
-              </a:spcAft>
-              <a:buNone/>
-            </a:pPr>
-            <a:r>
-              <a:rPr lang="en" sz="1200" i="1" dirty="0">
-                <a:solidFill>
-                  <a:srgbClr val="999999"/>
-                </a:solidFill>
-              </a:rPr>
-              <a:t>We’ll build something together and then give a demo to Analytics.</a:t>
-            </a:r>
-            <a:endParaRPr sz="1200" i="1" dirty="0">
-              <a:solidFill>
-                <a:srgbClr val="999999"/>
-              </a:solidFill>
-            </a:endParaRPr>
-          </a:p>
-          <a:p>
-            <a:pPr marL="0" lvl="0" indent="457200" algn="l" rtl="0">
-              <a:lnSpc>
-                <a:spcPct val="100000"/>
-              </a:lnSpc>
-              <a:spcBef>
-                <a:spcPts val="0"/>
-              </a:spcBef>
-              <a:spcAft>
-                <a:spcPts val="0"/>
-              </a:spcAft>
-              <a:buNone/>
-            </a:pPr>
-            <a:endParaRPr sz="1100" i="1" dirty="0">
-              <a:solidFill>
-                <a:srgbClr val="999999"/>
-              </a:solidFill>
-            </a:endParaRPr>
-          </a:p>
-          <a:p>
-            <a:pPr marL="0" lvl="0" indent="0" algn="l" rtl="0">
-              <a:lnSpc>
-                <a:spcPct val="100000"/>
-              </a:lnSpc>
-              <a:spcBef>
-                <a:spcPts val="0"/>
-              </a:spcBef>
-              <a:spcAft>
-                <a:spcPts val="0"/>
-              </a:spcAft>
-              <a:buNone/>
-            </a:pPr>
-            <a:r>
-              <a:rPr lang="en" sz="1500" dirty="0"/>
-              <a:t>A way to shake things up a bit</a:t>
-            </a:r>
-            <a:endParaRPr sz="1500" dirty="0"/>
-          </a:p>
-          <a:p>
-            <a:pPr marL="0" lvl="0" indent="457200" algn="l" rtl="0">
-              <a:lnSpc>
-                <a:spcPct val="100000"/>
-              </a:lnSpc>
-              <a:spcBef>
-                <a:spcPts val="0"/>
-              </a:spcBef>
-              <a:spcAft>
-                <a:spcPts val="0"/>
-              </a:spcAft>
-              <a:buNone/>
-            </a:pPr>
-            <a:r>
-              <a:rPr lang="en" sz="1200" i="1" dirty="0">
-                <a:solidFill>
-                  <a:srgbClr val="999999"/>
-                </a:solidFill>
-              </a:rPr>
-              <a:t>This should be a fun diversion from the other projects we’ve been working on. :-) </a:t>
-            </a:r>
-            <a:endParaRPr sz="1400" dirty="0"/>
-          </a:p>
-        </p:txBody>
-      </p:sp>
-      <p:sp>
-        <p:nvSpPr>
-          <p:cNvPr id="89" name="Google Shape;89;p13"/>
-          <p:cNvSpPr txBox="1">
-            <a:spLocks noGrp="1"/>
-          </p:cNvSpPr>
-          <p:nvPr>
-            <p:ph type="title"/>
-          </p:nvPr>
-        </p:nvSpPr>
-        <p:spPr>
-          <a:xfrm>
-            <a:off x="727650" y="581300"/>
-            <a:ext cx="7688700" cy="535200"/>
-          </a:xfrm>
-          <a:prstGeom prst="rect">
-            <a:avLst/>
-          </a:prstGeom>
-        </p:spPr>
-        <p:txBody>
-          <a:bodyPr spcFirstLastPara="1" wrap="square" lIns="91425" tIns="91425" rIns="91425" bIns="91425" anchor="t" anchorCtr="0">
-            <a:normAutofit fontScale="90000"/>
-          </a:bodyPr>
-          <a:lstStyle/>
-          <a:p>
-            <a:pPr marL="0" lvl="0" indent="0" algn="l" rtl="0">
-              <a:spcBef>
-                <a:spcPts val="0"/>
-              </a:spcBef>
-              <a:spcAft>
-                <a:spcPts val="0"/>
-              </a:spcAft>
-              <a:buNone/>
-            </a:pPr>
-            <a:r>
-              <a:rPr lang="en" dirty="0"/>
-              <a:t>What is Project Lambda?</a:t>
-            </a:r>
-            <a:endParaRPr dirty="0"/>
-          </a:p>
-          <a:p>
-            <a:pPr marL="0" lvl="0" indent="0" algn="l" rtl="0">
-              <a:spcBef>
-                <a:spcPts val="0"/>
-              </a:spcBef>
-              <a:spcAft>
-                <a:spcPts val="0"/>
-              </a:spcAft>
-              <a:buNone/>
-            </a:pPr>
-            <a:r>
-              <a:rPr lang="en" sz="1077" i="1" dirty="0"/>
-              <a:t>(Also, why are you making me do this?)</a:t>
-            </a:r>
-            <a:endParaRPr sz="1077" i="1" dirty="0"/>
-          </a:p>
-          <a:p>
-            <a:pPr marL="0" lvl="0" indent="0" algn="l" rtl="0">
-              <a:spcBef>
-                <a:spcPts val="0"/>
-              </a:spcBef>
-              <a:spcAft>
-                <a:spcPts val="0"/>
-              </a:spcAft>
-              <a:buNone/>
-            </a:pPr>
-            <a:endParaRPr dirty="0"/>
-          </a:p>
-        </p:txBody>
-      </p:sp>
-      <p:sp>
-        <p:nvSpPr>
-          <p:cNvPr id="3" name="TextBox 2">
-            <a:extLst>
-              <a:ext uri="{FF2B5EF4-FFF2-40B4-BE49-F238E27FC236}">
-                <a16:creationId xmlns:a16="http://schemas.microsoft.com/office/drawing/2014/main" id="{38B93346-E996-6294-16AB-327747152D5A}"/>
-              </a:ext>
-            </a:extLst>
-          </p:cNvPr>
-          <p:cNvSpPr txBox="1"/>
-          <p:nvPr/>
-        </p:nvSpPr>
-        <p:spPr>
-          <a:xfrm>
-            <a:off x="2768400" y="1775712"/>
-            <a:ext cx="4572000" cy="307777"/>
-          </a:xfrm>
-          <a:prstGeom prst="rect">
-            <a:avLst/>
-          </a:prstGeom>
-          <a:noFill/>
-        </p:spPr>
-        <p:txBody>
-          <a:bodyPr wrap="square">
-            <a:spAutoFit/>
-          </a:bodyPr>
-          <a:lstStyle/>
-          <a:p>
-            <a:r>
-              <a:rPr lang="en-US" dirty="0"/>
-              <a:t>✅ </a:t>
-            </a:r>
-          </a:p>
-        </p:txBody>
-      </p:sp>
-      <p:sp>
-        <p:nvSpPr>
-          <p:cNvPr id="5" name="TextBox 4">
-            <a:extLst>
-              <a:ext uri="{FF2B5EF4-FFF2-40B4-BE49-F238E27FC236}">
-                <a16:creationId xmlns:a16="http://schemas.microsoft.com/office/drawing/2014/main" id="{AF4BAF4B-160C-2A39-729F-013C331AB8A3}"/>
-              </a:ext>
-            </a:extLst>
-          </p:cNvPr>
-          <p:cNvSpPr txBox="1"/>
-          <p:nvPr/>
-        </p:nvSpPr>
-        <p:spPr>
-          <a:xfrm>
-            <a:off x="2797200" y="2392112"/>
-            <a:ext cx="4572000" cy="307777"/>
-          </a:xfrm>
-          <a:prstGeom prst="rect">
-            <a:avLst/>
-          </a:prstGeom>
-          <a:noFill/>
-        </p:spPr>
-        <p:txBody>
-          <a:bodyPr wrap="square">
-            <a:spAutoFit/>
-          </a:bodyPr>
-          <a:lstStyle/>
-          <a:p>
-            <a:r>
-              <a:rPr lang="en-US" dirty="0"/>
-              <a:t>✅ </a:t>
-            </a:r>
-          </a:p>
-        </p:txBody>
-      </p:sp>
-      <p:sp>
-        <p:nvSpPr>
-          <p:cNvPr id="7" name="TextBox 6">
-            <a:extLst>
-              <a:ext uri="{FF2B5EF4-FFF2-40B4-BE49-F238E27FC236}">
-                <a16:creationId xmlns:a16="http://schemas.microsoft.com/office/drawing/2014/main" id="{56FD06C8-7C49-413E-3FE7-A7E67FBEDC8E}"/>
-              </a:ext>
-            </a:extLst>
-          </p:cNvPr>
-          <p:cNvSpPr txBox="1"/>
-          <p:nvPr/>
-        </p:nvSpPr>
-        <p:spPr>
-          <a:xfrm>
-            <a:off x="3250800" y="3007406"/>
-            <a:ext cx="4572000" cy="307777"/>
-          </a:xfrm>
-          <a:prstGeom prst="rect">
-            <a:avLst/>
-          </a:prstGeom>
-          <a:noFill/>
-        </p:spPr>
-        <p:txBody>
-          <a:bodyPr wrap="square">
-            <a:spAutoFit/>
-          </a:bodyPr>
-          <a:lstStyle/>
-          <a:p>
-            <a:r>
-              <a:rPr lang="en-US" dirty="0"/>
-              <a:t>✅ </a:t>
-            </a:r>
-          </a:p>
-        </p:txBody>
-      </p:sp>
-      <p:sp>
-        <p:nvSpPr>
-          <p:cNvPr id="9" name="TextBox 8">
-            <a:extLst>
-              <a:ext uri="{FF2B5EF4-FFF2-40B4-BE49-F238E27FC236}">
-                <a16:creationId xmlns:a16="http://schemas.microsoft.com/office/drawing/2014/main" id="{3D974BAF-40C4-FD2A-881A-DC084CEB1D0F}"/>
-              </a:ext>
-            </a:extLst>
-          </p:cNvPr>
-          <p:cNvSpPr txBox="1"/>
-          <p:nvPr/>
-        </p:nvSpPr>
-        <p:spPr>
-          <a:xfrm>
-            <a:off x="3308400" y="3584564"/>
-            <a:ext cx="4572000" cy="307777"/>
-          </a:xfrm>
-          <a:prstGeom prst="rect">
-            <a:avLst/>
-          </a:prstGeom>
-          <a:noFill/>
-        </p:spPr>
-        <p:txBody>
-          <a:bodyPr wrap="square">
-            <a:spAutoFit/>
-          </a:bodyPr>
-          <a:lstStyle/>
-          <a:p>
-            <a:r>
-              <a:rPr lang="en-US" dirty="0"/>
-              <a:t>✅ </a:t>
-            </a:r>
-          </a:p>
-        </p:txBody>
-      </p:sp>
-    </p:spTree>
-  </p:cSld>
-  <p:clrMapOvr>
-    <a:masterClrMapping/>
-  </p:clrMapOvr>
-</p:sld>
-</file>
-
-<file path=ppt/slides/slide20.xml><?xml version="1.0" encoding="utf-8"?>
+<file path=ppt/slides/slide18.xml><?xml version="1.0" encoding="utf-8"?>
 <p:sld xmlns:a="http://schemas.openxmlformats.org/drawingml/2006/main" xmlns:r="http://schemas.openxmlformats.org/officeDocument/2006/relationships" xmlns:p="http://schemas.openxmlformats.org/presentationml/2006/main">
   <p:cSld>
     <p:spTree>
@@ -16236,7 +15084,7 @@
 </p:sld>
 </file>
 
-<file path=ppt/slides/slide21.xml><?xml version="1.0" encoding="utf-8"?>
+<file path=ppt/slides/slide19.xml><?xml version="1.0" encoding="utf-8"?>
 <p:sld xmlns:a="http://schemas.openxmlformats.org/drawingml/2006/main" xmlns:r="http://schemas.openxmlformats.org/officeDocument/2006/relationships" xmlns:p="http://schemas.openxmlformats.org/presentationml/2006/main">
   <p:cSld>
     <p:spTree>
@@ -16947,6 +15795,504 @@
 </p:sld>
 </file>
 
+<file path=ppt/slides/slide2.xml><?xml version="1.0" encoding="utf-8"?>
+<p:sld xmlns:a="http://schemas.openxmlformats.org/drawingml/2006/main" xmlns:r="http://schemas.openxmlformats.org/officeDocument/2006/relationships" xmlns:p="http://schemas.openxmlformats.org/presentationml/2006/main">
+  <p:cSld>
+    <p:spTree>
+      <p:nvGrpSpPr>
+        <p:cNvPr id="1" name="Shape 87"/>
+        <p:cNvGrpSpPr/>
+        <p:nvPr/>
+      </p:nvGrpSpPr>
+      <p:grpSpPr>
+        <a:xfrm>
+          <a:off x="0" y="0"/>
+          <a:ext cx="0" cy="0"/>
+          <a:chOff x="0" y="0"/>
+          <a:chExt cx="0" cy="0"/>
+        </a:xfrm>
+      </p:grpSpPr>
+      <p:sp>
+        <p:nvSpPr>
+          <p:cNvPr id="88" name="Google Shape;88;p13"/>
+          <p:cNvSpPr txBox="1">
+            <a:spLocks noGrp="1"/>
+          </p:cNvSpPr>
+          <p:nvPr>
+            <p:ph type="body" idx="1"/>
+          </p:nvPr>
+        </p:nvSpPr>
+        <p:spPr>
+          <a:xfrm>
+            <a:off x="729450" y="1704100"/>
+            <a:ext cx="7688700" cy="2635800"/>
+          </a:xfrm>
+          <a:prstGeom prst="rect">
+            <a:avLst/>
+          </a:prstGeom>
+        </p:spPr>
+        <p:txBody>
+          <a:bodyPr spcFirstLastPara="1" wrap="square" lIns="91425" tIns="91425" rIns="91425" bIns="91425" anchor="t" anchorCtr="0">
+            <a:normAutofit/>
+          </a:bodyPr>
+          <a:lstStyle/>
+          <a:p>
+            <a:pPr marL="0" lvl="0" indent="0" algn="l" rtl="0">
+              <a:lnSpc>
+                <a:spcPct val="100000"/>
+              </a:lnSpc>
+              <a:spcBef>
+                <a:spcPts val="0"/>
+              </a:spcBef>
+              <a:spcAft>
+                <a:spcPts val="0"/>
+              </a:spcAft>
+              <a:buNone/>
+            </a:pPr>
+            <a:r>
+              <a:rPr lang="en" sz="1500" dirty="0"/>
+              <a:t>An opportunity to learn</a:t>
+            </a:r>
+            <a:endParaRPr sz="1500" dirty="0"/>
+          </a:p>
+          <a:p>
+            <a:pPr marL="0" lvl="0" indent="457200" algn="l" rtl="0">
+              <a:lnSpc>
+                <a:spcPct val="100000"/>
+              </a:lnSpc>
+              <a:spcBef>
+                <a:spcPts val="0"/>
+              </a:spcBef>
+              <a:spcAft>
+                <a:spcPts val="0"/>
+              </a:spcAft>
+              <a:buNone/>
+            </a:pPr>
+            <a:r>
+              <a:rPr lang="en" sz="1200" i="1" dirty="0">
+                <a:solidFill>
+                  <a:srgbClr val="999999"/>
+                </a:solidFill>
+              </a:rPr>
+              <a:t>A group project where everyone is learning something new.</a:t>
+            </a:r>
+            <a:endParaRPr sz="1200" i="1" dirty="0">
+              <a:solidFill>
+                <a:srgbClr val="999999"/>
+              </a:solidFill>
+            </a:endParaRPr>
+          </a:p>
+          <a:p>
+            <a:pPr marL="0" lvl="0" indent="0" algn="l" rtl="0">
+              <a:lnSpc>
+                <a:spcPct val="100000"/>
+              </a:lnSpc>
+              <a:spcBef>
+                <a:spcPts val="0"/>
+              </a:spcBef>
+              <a:spcAft>
+                <a:spcPts val="0"/>
+              </a:spcAft>
+              <a:buNone/>
+            </a:pPr>
+            <a:endParaRPr dirty="0"/>
+          </a:p>
+          <a:p>
+            <a:pPr marL="0" lvl="0" indent="0" algn="l" rtl="0">
+              <a:lnSpc>
+                <a:spcPct val="100000"/>
+              </a:lnSpc>
+              <a:spcBef>
+                <a:spcPts val="0"/>
+              </a:spcBef>
+              <a:spcAft>
+                <a:spcPts val="0"/>
+              </a:spcAft>
+              <a:buNone/>
+            </a:pPr>
+            <a:r>
+              <a:rPr lang="en" sz="1500" dirty="0"/>
+              <a:t>An opportunity to teach</a:t>
+            </a:r>
+            <a:endParaRPr sz="1500" dirty="0"/>
+          </a:p>
+          <a:p>
+            <a:pPr marL="0" lvl="0" indent="0" algn="l" rtl="0">
+              <a:lnSpc>
+                <a:spcPct val="100000"/>
+              </a:lnSpc>
+              <a:spcBef>
+                <a:spcPts val="0"/>
+              </a:spcBef>
+              <a:spcAft>
+                <a:spcPts val="0"/>
+              </a:spcAft>
+              <a:buNone/>
+            </a:pPr>
+            <a:r>
+              <a:rPr lang="en" sz="1100" i="1" dirty="0">
+                <a:solidFill>
+                  <a:srgbClr val="999999"/>
+                </a:solidFill>
+              </a:rPr>
+              <a:t>              </a:t>
+            </a:r>
+            <a:r>
+              <a:rPr lang="en" sz="1200" i="1" dirty="0">
+                <a:solidFill>
+                  <a:srgbClr val="999999"/>
+                </a:solidFill>
+              </a:rPr>
+              <a:t>We’ll divide up the work and teach each other what we’ve learned.</a:t>
+            </a:r>
+            <a:endParaRPr sz="1200" i="1" dirty="0">
+              <a:solidFill>
+                <a:srgbClr val="999999"/>
+              </a:solidFill>
+            </a:endParaRPr>
+          </a:p>
+          <a:p>
+            <a:pPr marL="0" lvl="0" indent="0" algn="l" rtl="0">
+              <a:lnSpc>
+                <a:spcPct val="100000"/>
+              </a:lnSpc>
+              <a:spcBef>
+                <a:spcPts val="0"/>
+              </a:spcBef>
+              <a:spcAft>
+                <a:spcPts val="0"/>
+              </a:spcAft>
+              <a:buNone/>
+            </a:pPr>
+            <a:endParaRPr dirty="0"/>
+          </a:p>
+          <a:p>
+            <a:pPr marL="0" lvl="0" indent="0" algn="l" rtl="0">
+              <a:lnSpc>
+                <a:spcPct val="100000"/>
+              </a:lnSpc>
+              <a:spcBef>
+                <a:spcPts val="0"/>
+              </a:spcBef>
+              <a:spcAft>
+                <a:spcPts val="0"/>
+              </a:spcAft>
+              <a:buNone/>
+            </a:pPr>
+            <a:r>
+              <a:rPr lang="en" sz="1500" dirty="0"/>
+              <a:t>An opportunity to collaborate</a:t>
+            </a:r>
+            <a:endParaRPr sz="1500" dirty="0"/>
+          </a:p>
+          <a:p>
+            <a:pPr marL="0" lvl="0" indent="457200" algn="l" rtl="0">
+              <a:lnSpc>
+                <a:spcPct val="100000"/>
+              </a:lnSpc>
+              <a:spcBef>
+                <a:spcPts val="0"/>
+              </a:spcBef>
+              <a:spcAft>
+                <a:spcPts val="0"/>
+              </a:spcAft>
+              <a:buNone/>
+            </a:pPr>
+            <a:r>
+              <a:rPr lang="en" sz="1200" i="1" dirty="0">
+                <a:solidFill>
+                  <a:srgbClr val="999999"/>
+                </a:solidFill>
+              </a:rPr>
+              <a:t>We’ll build something together and then give a demo to Analytics.</a:t>
+            </a:r>
+            <a:endParaRPr sz="1200" i="1" dirty="0">
+              <a:solidFill>
+                <a:srgbClr val="999999"/>
+              </a:solidFill>
+            </a:endParaRPr>
+          </a:p>
+          <a:p>
+            <a:pPr marL="0" lvl="0" indent="457200" algn="l" rtl="0">
+              <a:lnSpc>
+                <a:spcPct val="100000"/>
+              </a:lnSpc>
+              <a:spcBef>
+                <a:spcPts val="0"/>
+              </a:spcBef>
+              <a:spcAft>
+                <a:spcPts val="0"/>
+              </a:spcAft>
+              <a:buNone/>
+            </a:pPr>
+            <a:endParaRPr sz="1100" i="1" dirty="0">
+              <a:solidFill>
+                <a:srgbClr val="999999"/>
+              </a:solidFill>
+            </a:endParaRPr>
+          </a:p>
+          <a:p>
+            <a:pPr marL="0" lvl="0" indent="0" algn="l" rtl="0">
+              <a:lnSpc>
+                <a:spcPct val="100000"/>
+              </a:lnSpc>
+              <a:spcBef>
+                <a:spcPts val="0"/>
+              </a:spcBef>
+              <a:spcAft>
+                <a:spcPts val="0"/>
+              </a:spcAft>
+              <a:buNone/>
+            </a:pPr>
+            <a:r>
+              <a:rPr lang="en" sz="1500" dirty="0"/>
+              <a:t>A way to shake things up a bit</a:t>
+            </a:r>
+            <a:endParaRPr sz="1500" dirty="0"/>
+          </a:p>
+          <a:p>
+            <a:pPr marL="0" lvl="0" indent="457200" algn="l" rtl="0">
+              <a:lnSpc>
+                <a:spcPct val="100000"/>
+              </a:lnSpc>
+              <a:spcBef>
+                <a:spcPts val="0"/>
+              </a:spcBef>
+              <a:spcAft>
+                <a:spcPts val="0"/>
+              </a:spcAft>
+              <a:buNone/>
+            </a:pPr>
+            <a:r>
+              <a:rPr lang="en" sz="1200" i="1" dirty="0">
+                <a:solidFill>
+                  <a:srgbClr val="999999"/>
+                </a:solidFill>
+              </a:rPr>
+              <a:t>This should be a fun diversion from the other projects we’ve been working on. :-) </a:t>
+            </a:r>
+            <a:endParaRPr sz="1400" dirty="0"/>
+          </a:p>
+        </p:txBody>
+      </p:sp>
+      <p:sp>
+        <p:nvSpPr>
+          <p:cNvPr id="89" name="Google Shape;89;p13"/>
+          <p:cNvSpPr txBox="1">
+            <a:spLocks noGrp="1"/>
+          </p:cNvSpPr>
+          <p:nvPr>
+            <p:ph type="title"/>
+          </p:nvPr>
+        </p:nvSpPr>
+        <p:spPr>
+          <a:xfrm>
+            <a:off x="727650" y="581300"/>
+            <a:ext cx="7688700" cy="535200"/>
+          </a:xfrm>
+          <a:prstGeom prst="rect">
+            <a:avLst/>
+          </a:prstGeom>
+        </p:spPr>
+        <p:txBody>
+          <a:bodyPr spcFirstLastPara="1" wrap="square" lIns="91425" tIns="91425" rIns="91425" bIns="91425" anchor="t" anchorCtr="0">
+            <a:normAutofit fontScale="90000"/>
+          </a:bodyPr>
+          <a:lstStyle/>
+          <a:p>
+            <a:pPr marL="0" lvl="0" indent="0" algn="l" rtl="0">
+              <a:spcBef>
+                <a:spcPts val="0"/>
+              </a:spcBef>
+              <a:spcAft>
+                <a:spcPts val="0"/>
+              </a:spcAft>
+              <a:buNone/>
+            </a:pPr>
+            <a:r>
+              <a:rPr lang="en" dirty="0"/>
+              <a:t>What is Project Lambda?</a:t>
+            </a:r>
+            <a:endParaRPr dirty="0"/>
+          </a:p>
+          <a:p>
+            <a:pPr marL="0" lvl="0" indent="0" algn="l" rtl="0">
+              <a:spcBef>
+                <a:spcPts val="0"/>
+              </a:spcBef>
+              <a:spcAft>
+                <a:spcPts val="0"/>
+              </a:spcAft>
+              <a:buNone/>
+            </a:pPr>
+            <a:r>
+              <a:rPr lang="en" sz="1077" i="1" dirty="0"/>
+              <a:t>(Also, why are you making me do this?)</a:t>
+            </a:r>
+            <a:endParaRPr sz="1077" i="1" dirty="0"/>
+          </a:p>
+          <a:p>
+            <a:pPr marL="0" lvl="0" indent="0" algn="l" rtl="0">
+              <a:spcBef>
+                <a:spcPts val="0"/>
+              </a:spcBef>
+              <a:spcAft>
+                <a:spcPts val="0"/>
+              </a:spcAft>
+              <a:buNone/>
+            </a:pPr>
+            <a:endParaRPr dirty="0"/>
+          </a:p>
+        </p:txBody>
+      </p:sp>
+      <p:sp>
+        <p:nvSpPr>
+          <p:cNvPr id="3" name="TextBox 2">
+            <a:extLst>
+              <a:ext uri="{FF2B5EF4-FFF2-40B4-BE49-F238E27FC236}">
+                <a16:creationId xmlns:a16="http://schemas.microsoft.com/office/drawing/2014/main" id="{38B93346-E996-6294-16AB-327747152D5A}"/>
+              </a:ext>
+            </a:extLst>
+          </p:cNvPr>
+          <p:cNvSpPr txBox="1"/>
+          <p:nvPr/>
+        </p:nvSpPr>
+        <p:spPr>
+          <a:xfrm>
+            <a:off x="2768400" y="1775712"/>
+            <a:ext cx="4572000" cy="307777"/>
+          </a:xfrm>
+          <a:prstGeom prst="rect">
+            <a:avLst/>
+          </a:prstGeom>
+          <a:noFill/>
+        </p:spPr>
+        <p:txBody>
+          <a:bodyPr wrap="square">
+            <a:spAutoFit/>
+          </a:bodyPr>
+          <a:lstStyle/>
+          <a:p>
+            <a:r>
+              <a:rPr lang="en-US" dirty="0"/>
+              <a:t>✅ </a:t>
+            </a:r>
+          </a:p>
+        </p:txBody>
+      </p:sp>
+      <p:sp>
+        <p:nvSpPr>
+          <p:cNvPr id="5" name="TextBox 4">
+            <a:extLst>
+              <a:ext uri="{FF2B5EF4-FFF2-40B4-BE49-F238E27FC236}">
+                <a16:creationId xmlns:a16="http://schemas.microsoft.com/office/drawing/2014/main" id="{AF4BAF4B-160C-2A39-729F-013C331AB8A3}"/>
+              </a:ext>
+            </a:extLst>
+          </p:cNvPr>
+          <p:cNvSpPr txBox="1"/>
+          <p:nvPr/>
+        </p:nvSpPr>
+        <p:spPr>
+          <a:xfrm>
+            <a:off x="2797200" y="2392112"/>
+            <a:ext cx="4572000" cy="307777"/>
+          </a:xfrm>
+          <a:prstGeom prst="rect">
+            <a:avLst/>
+          </a:prstGeom>
+          <a:noFill/>
+        </p:spPr>
+        <p:txBody>
+          <a:bodyPr wrap="square">
+            <a:spAutoFit/>
+          </a:bodyPr>
+          <a:lstStyle/>
+          <a:p>
+            <a:r>
+              <a:rPr lang="en-US" dirty="0"/>
+              <a:t>✅ </a:t>
+            </a:r>
+          </a:p>
+        </p:txBody>
+      </p:sp>
+      <p:sp>
+        <p:nvSpPr>
+          <p:cNvPr id="7" name="TextBox 6">
+            <a:extLst>
+              <a:ext uri="{FF2B5EF4-FFF2-40B4-BE49-F238E27FC236}">
+                <a16:creationId xmlns:a16="http://schemas.microsoft.com/office/drawing/2014/main" id="{56FD06C8-7C49-413E-3FE7-A7E67FBEDC8E}"/>
+              </a:ext>
+            </a:extLst>
+          </p:cNvPr>
+          <p:cNvSpPr txBox="1"/>
+          <p:nvPr/>
+        </p:nvSpPr>
+        <p:spPr>
+          <a:xfrm>
+            <a:off x="3250800" y="3007406"/>
+            <a:ext cx="4572000" cy="307777"/>
+          </a:xfrm>
+          <a:prstGeom prst="rect">
+            <a:avLst/>
+          </a:prstGeom>
+          <a:noFill/>
+        </p:spPr>
+        <p:txBody>
+          <a:bodyPr wrap="square">
+            <a:spAutoFit/>
+          </a:bodyPr>
+          <a:lstStyle/>
+          <a:p>
+            <a:r>
+              <a:rPr lang="en-US" dirty="0"/>
+              <a:t>✅ </a:t>
+            </a:r>
+          </a:p>
+        </p:txBody>
+      </p:sp>
+      <p:sp>
+        <p:nvSpPr>
+          <p:cNvPr id="9" name="TextBox 8">
+            <a:extLst>
+              <a:ext uri="{FF2B5EF4-FFF2-40B4-BE49-F238E27FC236}">
+                <a16:creationId xmlns:a16="http://schemas.microsoft.com/office/drawing/2014/main" id="{3D974BAF-40C4-FD2A-881A-DC084CEB1D0F}"/>
+              </a:ext>
+            </a:extLst>
+          </p:cNvPr>
+          <p:cNvSpPr txBox="1"/>
+          <p:nvPr/>
+        </p:nvSpPr>
+        <p:spPr>
+          <a:xfrm>
+            <a:off x="3308400" y="3584564"/>
+            <a:ext cx="4572000" cy="307777"/>
+          </a:xfrm>
+          <a:prstGeom prst="rect">
+            <a:avLst/>
+          </a:prstGeom>
+          <a:noFill/>
+        </p:spPr>
+        <p:txBody>
+          <a:bodyPr wrap="square">
+            <a:spAutoFit/>
+          </a:bodyPr>
+          <a:lstStyle/>
+          <a:p>
+            <a:r>
+              <a:rPr lang="en-US" dirty="0"/>
+              <a:t>✅ </a:t>
+            </a:r>
+          </a:p>
+        </p:txBody>
+      </p:sp>
+    </p:spTree>
+  </p:cSld>
+  <p:clrMapOvr>
+    <a:masterClrMapping/>
+  </p:clrMapOvr>
+</p:sld>
+</file>
+
 <file path=ppt/slides/slide3.xml><?xml version="1.0" encoding="utf-8"?>
 <p:sld xmlns:a="http://schemas.openxmlformats.org/drawingml/2006/main" xmlns:r="http://schemas.openxmlformats.org/officeDocument/2006/relationships" xmlns:p="http://schemas.openxmlformats.org/presentationml/2006/main">
   <p:cSld>
@@ -18149,7 +17495,7 @@
         </p:spPr>
         <p:txBody>
           <a:bodyPr spcFirstLastPara="1" wrap="square" lIns="91425" tIns="91425" rIns="91425" bIns="91425" anchor="t" anchorCtr="0">
-            <a:normAutofit lnSpcReduction="10000"/>
+            <a:normAutofit/>
           </a:bodyPr>
           <a:lstStyle/>
           <a:p>
@@ -18269,81 +17615,6 @@
               <a:t> at the claims header level</a:t>
             </a:r>
             <a:endParaRPr lang="en" dirty="0"/>
-          </a:p>
-          <a:p>
-            <a:pPr marL="146050" lvl="0" indent="0" algn="l" rtl="0">
-              <a:lnSpc>
-                <a:spcPct val="150000"/>
-              </a:lnSpc>
-              <a:spcBef>
-                <a:spcPts val="0"/>
-              </a:spcBef>
-              <a:spcAft>
-                <a:spcPts val="0"/>
-              </a:spcAft>
-              <a:buSzPts val="1300"/>
-              <a:buNone/>
-            </a:pPr>
-            <a:endParaRPr lang="en" b="1" dirty="0"/>
-          </a:p>
-          <a:p>
-            <a:pPr marL="146050" lvl="0" indent="0" algn="l" rtl="0">
-              <a:lnSpc>
-                <a:spcPct val="150000"/>
-              </a:lnSpc>
-              <a:spcBef>
-                <a:spcPts val="0"/>
-              </a:spcBef>
-              <a:spcAft>
-                <a:spcPts val="0"/>
-              </a:spcAft>
-              <a:buSzPts val="1300"/>
-              <a:buNone/>
-            </a:pPr>
-            <a:r>
-              <a:rPr lang="en" b="1" dirty="0"/>
-              <a:t>Next version: Flag </a:t>
-            </a:r>
-            <a:r>
-              <a:rPr lang="en" b="1" u="sng" dirty="0">
-                <a:solidFill>
-                  <a:srgbClr val="1155CC"/>
-                </a:solidFill>
-                <a:hlinkClick r:id="rId4">
-                  <a:extLst>
-                    <a:ext uri="{A12FA001-AC4F-418D-AE19-62706E023703}">
-                      <ahyp:hlinkClr xmlns:ahyp="http://schemas.microsoft.com/office/drawing/2018/hyperlinkcolor" val="tx"/>
-                    </a:ext>
-                  </a:extLst>
-                </a:hlinkClick>
-              </a:rPr>
-              <a:t>Readmissions</a:t>
-            </a:r>
-            <a:endParaRPr lang="en-US" b="1" dirty="0">
-              <a:solidFill>
-                <a:schemeClr val="dk1"/>
-              </a:solidFill>
-            </a:endParaRPr>
-          </a:p>
-          <a:p>
-            <a:pPr marL="146050" lvl="0" indent="0" algn="l" rtl="0">
-              <a:lnSpc>
-                <a:spcPct val="150000"/>
-              </a:lnSpc>
-              <a:spcBef>
-                <a:spcPts val="0"/>
-              </a:spcBef>
-              <a:spcAft>
-                <a:spcPts val="0"/>
-              </a:spcAft>
-              <a:buSzPts val="1300"/>
-              <a:buNone/>
-            </a:pPr>
-            <a:endParaRPr lang="en-US" b="1" dirty="0">
-              <a:solidFill>
-                <a:schemeClr val="dk1"/>
-              </a:solidFill>
-            </a:endParaRPr>
           </a:p>
         </p:txBody>
       </p:sp>

</xml_diff>